<commit_message>
added 1_pds portfolio section
</commit_message>
<xml_diff>
--- a/assets/img/edits.pptx
+++ b/assets/img/edits.pptx
@@ -6,6 +6,7 @@
   </p:sldMasterIdLst>
   <p:sldIdLst>
     <p:sldId id="256" r:id="rId2"/>
+    <p:sldId id="257" r:id="rId3"/>
   </p:sldIdLst>
   <p:sldSz cx="12192000" cy="6858000"/>
   <p:notesSz cx="6858000" cy="9144000"/>
@@ -104,6 +105,11 @@
       </a:defRPr>
     </a:lvl9pPr>
   </p:defaultTextStyle>
+  <p:extLst>
+    <p:ext uri="{EFAFB233-063F-42B5-8137-9DF3F51BA10A}">
+      <p15:sldGuideLst xmlns:p15="http://schemas.microsoft.com/office/powerpoint/2012/main"/>
+    </p:ext>
+  </p:extLst>
 </p:presentation>
 </file>
 
@@ -254,7 +260,7 @@
           <a:p>
             <a:fld id="{B92378E2-377C-4075-8CE6-810BAADB50C9}" type="datetimeFigureOut">
               <a:rPr lang="en-US" smtClean="0"/>
-              <a:t>10/14/2024</a:t>
+              <a:t>10/15/2024</a:t>
             </a:fld>
             <a:endParaRPr lang="en-US"/>
           </a:p>
@@ -452,7 +458,7 @@
           <a:p>
             <a:fld id="{B92378E2-377C-4075-8CE6-810BAADB50C9}" type="datetimeFigureOut">
               <a:rPr lang="en-US" smtClean="0"/>
-              <a:t>10/14/2024</a:t>
+              <a:t>10/15/2024</a:t>
             </a:fld>
             <a:endParaRPr lang="en-US"/>
           </a:p>
@@ -660,7 +666,7 @@
           <a:p>
             <a:fld id="{B92378E2-377C-4075-8CE6-810BAADB50C9}" type="datetimeFigureOut">
               <a:rPr lang="en-US" smtClean="0"/>
-              <a:t>10/14/2024</a:t>
+              <a:t>10/15/2024</a:t>
             </a:fld>
             <a:endParaRPr lang="en-US"/>
           </a:p>
@@ -858,7 +864,7 @@
           <a:p>
             <a:fld id="{B92378E2-377C-4075-8CE6-810BAADB50C9}" type="datetimeFigureOut">
               <a:rPr lang="en-US" smtClean="0"/>
-              <a:t>10/14/2024</a:t>
+              <a:t>10/15/2024</a:t>
             </a:fld>
             <a:endParaRPr lang="en-US"/>
           </a:p>
@@ -1133,7 +1139,7 @@
           <a:p>
             <a:fld id="{B92378E2-377C-4075-8CE6-810BAADB50C9}" type="datetimeFigureOut">
               <a:rPr lang="en-US" smtClean="0"/>
-              <a:t>10/14/2024</a:t>
+              <a:t>10/15/2024</a:t>
             </a:fld>
             <a:endParaRPr lang="en-US"/>
           </a:p>
@@ -1398,7 +1404,7 @@
           <a:p>
             <a:fld id="{B92378E2-377C-4075-8CE6-810BAADB50C9}" type="datetimeFigureOut">
               <a:rPr lang="en-US" smtClean="0"/>
-              <a:t>10/14/2024</a:t>
+              <a:t>10/15/2024</a:t>
             </a:fld>
             <a:endParaRPr lang="en-US"/>
           </a:p>
@@ -1810,7 +1816,7 @@
           <a:p>
             <a:fld id="{B92378E2-377C-4075-8CE6-810BAADB50C9}" type="datetimeFigureOut">
               <a:rPr lang="en-US" smtClean="0"/>
-              <a:t>10/14/2024</a:t>
+              <a:t>10/15/2024</a:t>
             </a:fld>
             <a:endParaRPr lang="en-US"/>
           </a:p>
@@ -1951,7 +1957,7 @@
           <a:p>
             <a:fld id="{B92378E2-377C-4075-8CE6-810BAADB50C9}" type="datetimeFigureOut">
               <a:rPr lang="en-US" smtClean="0"/>
-              <a:t>10/14/2024</a:t>
+              <a:t>10/15/2024</a:t>
             </a:fld>
             <a:endParaRPr lang="en-US"/>
           </a:p>
@@ -2064,7 +2070,7 @@
           <a:p>
             <a:fld id="{B92378E2-377C-4075-8CE6-810BAADB50C9}" type="datetimeFigureOut">
               <a:rPr lang="en-US" smtClean="0"/>
-              <a:t>10/14/2024</a:t>
+              <a:t>10/15/2024</a:t>
             </a:fld>
             <a:endParaRPr lang="en-US"/>
           </a:p>
@@ -2375,7 +2381,7 @@
           <a:p>
             <a:fld id="{B92378E2-377C-4075-8CE6-810BAADB50C9}" type="datetimeFigureOut">
               <a:rPr lang="en-US" smtClean="0"/>
-              <a:t>10/14/2024</a:t>
+              <a:t>10/15/2024</a:t>
             </a:fld>
             <a:endParaRPr lang="en-US"/>
           </a:p>
@@ -2663,7 +2669,7 @@
           <a:p>
             <a:fld id="{B92378E2-377C-4075-8CE6-810BAADB50C9}" type="datetimeFigureOut">
               <a:rPr lang="en-US" smtClean="0"/>
-              <a:t>10/14/2024</a:t>
+              <a:t>10/15/2024</a:t>
             </a:fld>
             <a:endParaRPr lang="en-US"/>
           </a:p>
@@ -2904,7 +2910,7 @@
           <a:p>
             <a:fld id="{B92378E2-377C-4075-8CE6-810BAADB50C9}" type="datetimeFigureOut">
               <a:rPr lang="en-US" smtClean="0"/>
-              <a:t>10/14/2024</a:t>
+              <a:t>10/15/2024</a:t>
             </a:fld>
             <a:endParaRPr lang="en-US"/>
           </a:p>
@@ -3479,6 +3485,211 @@
 </p:sld>
 </file>
 
+<file path=ppt/slides/slide2.xml><?xml version="1.0" encoding="utf-8"?>
+<p:sld xmlns:a="http://schemas.openxmlformats.org/drawingml/2006/main" xmlns:r="http://schemas.openxmlformats.org/officeDocument/2006/relationships" xmlns:p="http://schemas.openxmlformats.org/presentationml/2006/main">
+  <p:cSld>
+    <p:spTree>
+      <p:nvGrpSpPr>
+        <p:cNvPr id="1" name=""/>
+        <p:cNvGrpSpPr/>
+        <p:nvPr/>
+      </p:nvGrpSpPr>
+      <p:grpSpPr>
+        <a:xfrm>
+          <a:off x="0" y="0"/>
+          <a:ext cx="0" cy="0"/>
+          <a:chOff x="0" y="0"/>
+          <a:chExt cx="0" cy="0"/>
+        </a:xfrm>
+      </p:grpSpPr>
+      <p:grpSp>
+        <p:nvGrpSpPr>
+          <p:cNvPr id="16" name="Group 15">
+            <a:extLst>
+              <a:ext uri="{FF2B5EF4-FFF2-40B4-BE49-F238E27FC236}">
+                <a16:creationId xmlns:a16="http://schemas.microsoft.com/office/drawing/2014/main" id="{6AD0FBDF-AB03-3A37-9AF9-5E5E2ABFB302}"/>
+              </a:ext>
+            </a:extLst>
+          </p:cNvPr>
+          <p:cNvGrpSpPr/>
+          <p:nvPr/>
+        </p:nvGrpSpPr>
+        <p:grpSpPr>
+          <a:xfrm>
+            <a:off x="1784150" y="0"/>
+            <a:ext cx="9144000" cy="6858000"/>
+            <a:chOff x="1784150" y="0"/>
+            <a:chExt cx="9144000" cy="6858000"/>
+          </a:xfrm>
+        </p:grpSpPr>
+        <p:pic>
+          <p:nvPicPr>
+            <p:cNvPr id="11" name="Picture 10" descr="A close-up of a grey surface&#10;&#10;Description automatically generated">
+              <a:extLst>
+                <a:ext uri="{FF2B5EF4-FFF2-40B4-BE49-F238E27FC236}">
+                  <a16:creationId xmlns:a16="http://schemas.microsoft.com/office/drawing/2014/main" id="{CA4A75A7-1322-8302-80FF-FEE45B30FE21}"/>
+                </a:ext>
+              </a:extLst>
+            </p:cNvPr>
+            <p:cNvPicPr>
+              <a:picLocks noChangeAspect="1"/>
+            </p:cNvPicPr>
+            <p:nvPr/>
+          </p:nvPicPr>
+          <p:blipFill>
+            <a:blip r:embed="rId2">
+              <a:extLst>
+                <a:ext uri="{28A0092B-C50C-407E-A947-70E740481C1C}">
+                  <a14:useLocalDpi xmlns:a14="http://schemas.microsoft.com/office/drawing/2010/main" val="0"/>
+                </a:ext>
+              </a:extLst>
+            </a:blip>
+            <a:stretch>
+              <a:fillRect/>
+            </a:stretch>
+          </p:blipFill>
+          <p:spPr>
+            <a:xfrm>
+              <a:off x="1784150" y="0"/>
+              <a:ext cx="9144000" cy="6858000"/>
+            </a:xfrm>
+            <a:prstGeom prst="rect">
+              <a:avLst/>
+            </a:prstGeom>
+          </p:spPr>
+        </p:pic>
+        <p:sp>
+          <p:nvSpPr>
+            <p:cNvPr id="8" name="Rectangle 7">
+              <a:extLst>
+                <a:ext uri="{FF2B5EF4-FFF2-40B4-BE49-F238E27FC236}">
+                  <a16:creationId xmlns:a16="http://schemas.microsoft.com/office/drawing/2014/main" id="{C1BE197C-971F-D9CD-CC9A-FE1FC93729F8}"/>
+                </a:ext>
+              </a:extLst>
+            </p:cNvPr>
+            <p:cNvSpPr/>
+            <p:nvPr/>
+          </p:nvSpPr>
+          <p:spPr>
+            <a:xfrm>
+              <a:off x="7305152" y="1"/>
+              <a:ext cx="3622998" cy="964641"/>
+            </a:xfrm>
+            <a:prstGeom prst="rect">
+              <a:avLst/>
+            </a:prstGeom>
+            <a:solidFill>
+              <a:schemeClr val="bg1"/>
+            </a:solidFill>
+            <a:ln>
+              <a:noFill/>
+            </a:ln>
+          </p:spPr>
+          <p:style>
+            <a:lnRef idx="2">
+              <a:schemeClr val="accent1">
+                <a:shade val="15000"/>
+              </a:schemeClr>
+            </a:lnRef>
+            <a:fillRef idx="1">
+              <a:schemeClr val="accent1"/>
+            </a:fillRef>
+            <a:effectRef idx="0">
+              <a:schemeClr val="accent1"/>
+            </a:effectRef>
+            <a:fontRef idx="minor">
+              <a:schemeClr val="lt1"/>
+            </a:fontRef>
+          </p:style>
+          <p:txBody>
+            <a:bodyPr rtlCol="0" anchor="ctr"/>
+            <a:lstStyle/>
+            <a:p>
+              <a:pPr algn="ctr"/>
+              <a:endParaRPr lang="en-US"/>
+            </a:p>
+          </p:txBody>
+        </p:sp>
+        <p:pic>
+          <p:nvPicPr>
+            <p:cNvPr id="13" name="Picture 12">
+              <a:extLst>
+                <a:ext uri="{FF2B5EF4-FFF2-40B4-BE49-F238E27FC236}">
+                  <a16:creationId xmlns:a16="http://schemas.microsoft.com/office/drawing/2014/main" id="{B3F5D53C-3ADD-98F3-8385-0C262AD9C241}"/>
+                </a:ext>
+              </a:extLst>
+            </p:cNvPr>
+            <p:cNvPicPr>
+              <a:picLocks noChangeAspect="1"/>
+            </p:cNvPicPr>
+            <p:nvPr/>
+          </p:nvPicPr>
+          <p:blipFill>
+            <a:blip r:embed="rId3"/>
+            <a:stretch>
+              <a:fillRect/>
+            </a:stretch>
+          </p:blipFill>
+          <p:spPr>
+            <a:xfrm>
+              <a:off x="9533657" y="192627"/>
+              <a:ext cx="1212785" cy="515782"/>
+            </a:xfrm>
+            <a:prstGeom prst="rect">
+              <a:avLst/>
+            </a:prstGeom>
+          </p:spPr>
+        </p:pic>
+        <p:pic>
+          <p:nvPicPr>
+            <p:cNvPr id="15" name="Picture 14" descr="A red and black logo&#10;&#10;Description automatically generated">
+              <a:extLst>
+                <a:ext uri="{FF2B5EF4-FFF2-40B4-BE49-F238E27FC236}">
+                  <a16:creationId xmlns:a16="http://schemas.microsoft.com/office/drawing/2014/main" id="{D33637CB-93D8-97BA-7F8F-20EEBE8E780E}"/>
+                </a:ext>
+              </a:extLst>
+            </p:cNvPr>
+            <p:cNvPicPr>
+              <a:picLocks noChangeAspect="1"/>
+            </p:cNvPicPr>
+            <p:nvPr/>
+          </p:nvPicPr>
+          <p:blipFill>
+            <a:blip r:embed="rId4">
+              <a:extLst>
+                <a:ext uri="{28A0092B-C50C-407E-A947-70E740481C1C}">
+                  <a14:useLocalDpi xmlns:a14="http://schemas.microsoft.com/office/drawing/2010/main" val="0"/>
+                </a:ext>
+              </a:extLst>
+            </a:blip>
+            <a:stretch>
+              <a:fillRect/>
+            </a:stretch>
+          </p:blipFill>
+          <p:spPr>
+            <a:xfrm>
+              <a:off x="7575285" y="192627"/>
+              <a:ext cx="1772353" cy="515782"/>
+            </a:xfrm>
+            <a:prstGeom prst="rect">
+              <a:avLst/>
+            </a:prstGeom>
+          </p:spPr>
+        </p:pic>
+      </p:grpSp>
+    </p:spTree>
+    <p:extLst>
+      <p:ext uri="{BB962C8B-B14F-4D97-AF65-F5344CB8AC3E}">
+        <p14:creationId xmlns:p14="http://schemas.microsoft.com/office/powerpoint/2010/main" val="4101402843"/>
+      </p:ext>
+    </p:extLst>
+  </p:cSld>
+  <p:clrMapOvr>
+    <a:masterClrMapping/>
+  </p:clrMapOvr>
+</p:sld>
+</file>
+
 <file path=ppt/theme/theme1.xml><?xml version="1.0" encoding="utf-8"?>
 <a:theme xmlns:a="http://schemas.openxmlformats.org/drawingml/2006/main" name="Office Theme">
   <a:themeElements>

</xml_diff>

<commit_message>
updated for first actual deployment
</commit_message>
<xml_diff>
--- a/assets/img/edits.pptx
+++ b/assets/img/edits.pptx
@@ -7,6 +7,9 @@
   <p:sldIdLst>
     <p:sldId id="256" r:id="rId2"/>
     <p:sldId id="257" r:id="rId3"/>
+    <p:sldId id="260" r:id="rId4"/>
+    <p:sldId id="258" r:id="rId5"/>
+    <p:sldId id="259" r:id="rId6"/>
   </p:sldIdLst>
   <p:sldSz cx="12192000" cy="6858000"/>
   <p:notesSz cx="6858000" cy="9144000"/>
@@ -260,7 +263,7 @@
           <a:p>
             <a:fld id="{B92378E2-377C-4075-8CE6-810BAADB50C9}" type="datetimeFigureOut">
               <a:rPr lang="en-US" smtClean="0"/>
-              <a:t>10/15/2024</a:t>
+              <a:t>11/5/2024</a:t>
             </a:fld>
             <a:endParaRPr lang="en-US"/>
           </a:p>
@@ -458,7 +461,7 @@
           <a:p>
             <a:fld id="{B92378E2-377C-4075-8CE6-810BAADB50C9}" type="datetimeFigureOut">
               <a:rPr lang="en-US" smtClean="0"/>
-              <a:t>10/15/2024</a:t>
+              <a:t>11/5/2024</a:t>
             </a:fld>
             <a:endParaRPr lang="en-US"/>
           </a:p>
@@ -666,7 +669,7 @@
           <a:p>
             <a:fld id="{B92378E2-377C-4075-8CE6-810BAADB50C9}" type="datetimeFigureOut">
               <a:rPr lang="en-US" smtClean="0"/>
-              <a:t>10/15/2024</a:t>
+              <a:t>11/5/2024</a:t>
             </a:fld>
             <a:endParaRPr lang="en-US"/>
           </a:p>
@@ -864,7 +867,7 @@
           <a:p>
             <a:fld id="{B92378E2-377C-4075-8CE6-810BAADB50C9}" type="datetimeFigureOut">
               <a:rPr lang="en-US" smtClean="0"/>
-              <a:t>10/15/2024</a:t>
+              <a:t>11/5/2024</a:t>
             </a:fld>
             <a:endParaRPr lang="en-US"/>
           </a:p>
@@ -1139,7 +1142,7 @@
           <a:p>
             <a:fld id="{B92378E2-377C-4075-8CE6-810BAADB50C9}" type="datetimeFigureOut">
               <a:rPr lang="en-US" smtClean="0"/>
-              <a:t>10/15/2024</a:t>
+              <a:t>11/5/2024</a:t>
             </a:fld>
             <a:endParaRPr lang="en-US"/>
           </a:p>
@@ -1404,7 +1407,7 @@
           <a:p>
             <a:fld id="{B92378E2-377C-4075-8CE6-810BAADB50C9}" type="datetimeFigureOut">
               <a:rPr lang="en-US" smtClean="0"/>
-              <a:t>10/15/2024</a:t>
+              <a:t>11/5/2024</a:t>
             </a:fld>
             <a:endParaRPr lang="en-US"/>
           </a:p>
@@ -1816,7 +1819,7 @@
           <a:p>
             <a:fld id="{B92378E2-377C-4075-8CE6-810BAADB50C9}" type="datetimeFigureOut">
               <a:rPr lang="en-US" smtClean="0"/>
-              <a:t>10/15/2024</a:t>
+              <a:t>11/5/2024</a:t>
             </a:fld>
             <a:endParaRPr lang="en-US"/>
           </a:p>
@@ -1957,7 +1960,7 @@
           <a:p>
             <a:fld id="{B92378E2-377C-4075-8CE6-810BAADB50C9}" type="datetimeFigureOut">
               <a:rPr lang="en-US" smtClean="0"/>
-              <a:t>10/15/2024</a:t>
+              <a:t>11/5/2024</a:t>
             </a:fld>
             <a:endParaRPr lang="en-US"/>
           </a:p>
@@ -2070,7 +2073,7 @@
           <a:p>
             <a:fld id="{B92378E2-377C-4075-8CE6-810BAADB50C9}" type="datetimeFigureOut">
               <a:rPr lang="en-US" smtClean="0"/>
-              <a:t>10/15/2024</a:t>
+              <a:t>11/5/2024</a:t>
             </a:fld>
             <a:endParaRPr lang="en-US"/>
           </a:p>
@@ -2381,7 +2384,7 @@
           <a:p>
             <a:fld id="{B92378E2-377C-4075-8CE6-810BAADB50C9}" type="datetimeFigureOut">
               <a:rPr lang="en-US" smtClean="0"/>
-              <a:t>10/15/2024</a:t>
+              <a:t>11/5/2024</a:t>
             </a:fld>
             <a:endParaRPr lang="en-US"/>
           </a:p>
@@ -2669,7 +2672,7 @@
           <a:p>
             <a:fld id="{B92378E2-377C-4075-8CE6-810BAADB50C9}" type="datetimeFigureOut">
               <a:rPr lang="en-US" smtClean="0"/>
-              <a:t>10/15/2024</a:t>
+              <a:t>11/5/2024</a:t>
             </a:fld>
             <a:endParaRPr lang="en-US"/>
           </a:p>
@@ -2910,7 +2913,7 @@
           <a:p>
             <a:fld id="{B92378E2-377C-4075-8CE6-810BAADB50C9}" type="datetimeFigureOut">
               <a:rPr lang="en-US" smtClean="0"/>
-              <a:t>10/15/2024</a:t>
+              <a:t>11/5/2024</a:t>
             </a:fld>
             <a:endParaRPr lang="en-US"/>
           </a:p>
@@ -3504,10 +3507,10 @@
       </p:grpSpPr>
       <p:grpSp>
         <p:nvGrpSpPr>
-          <p:cNvPr id="16" name="Group 15">
-            <a:extLst>
-              <a:ext uri="{FF2B5EF4-FFF2-40B4-BE49-F238E27FC236}">
-                <a16:creationId xmlns:a16="http://schemas.microsoft.com/office/drawing/2014/main" id="{6AD0FBDF-AB03-3A37-9AF9-5E5E2ABFB302}"/>
+          <p:cNvPr id="14" name="Group 13">
+            <a:extLst>
+              <a:ext uri="{FF2B5EF4-FFF2-40B4-BE49-F238E27FC236}">
+                <a16:creationId xmlns:a16="http://schemas.microsoft.com/office/drawing/2014/main" id="{A74E1A5D-A920-B8CC-F530-D18FE45C599A}"/>
               </a:ext>
             </a:extLst>
           </p:cNvPr>
@@ -3516,7 +3519,217 @@
         </p:nvGrpSpPr>
         <p:grpSpPr>
           <a:xfrm>
-            <a:off x="1784150" y="0"/>
+            <a:off x="1263850" y="0"/>
+            <a:ext cx="9664300" cy="6858000"/>
+            <a:chOff x="1263850" y="0"/>
+            <a:chExt cx="9664300" cy="6858000"/>
+          </a:xfrm>
+        </p:grpSpPr>
+        <p:pic>
+          <p:nvPicPr>
+            <p:cNvPr id="3" name="Picture 2" descr="A close-up of a computer screen&#10;&#10;Description automatically generated">
+              <a:extLst>
+                <a:ext uri="{FF2B5EF4-FFF2-40B4-BE49-F238E27FC236}">
+                  <a16:creationId xmlns:a16="http://schemas.microsoft.com/office/drawing/2014/main" id="{6DB9D8B6-FF5C-ED80-EBF1-0B65335014CC}"/>
+                </a:ext>
+              </a:extLst>
+            </p:cNvPr>
+            <p:cNvPicPr>
+              <a:picLocks noChangeAspect="1"/>
+            </p:cNvPicPr>
+            <p:nvPr/>
+          </p:nvPicPr>
+          <p:blipFill>
+            <a:blip r:embed="rId2">
+              <a:extLst>
+                <a:ext uri="{28A0092B-C50C-407E-A947-70E740481C1C}">
+                  <a14:useLocalDpi xmlns:a14="http://schemas.microsoft.com/office/drawing/2010/main" val="0"/>
+                </a:ext>
+              </a:extLst>
+            </a:blip>
+            <a:srcRect l="5285" b="10384"/>
+            <a:stretch/>
+          </p:blipFill>
+          <p:spPr>
+            <a:xfrm>
+              <a:off x="1263850" y="0"/>
+              <a:ext cx="9664300" cy="6858000"/>
+            </a:xfrm>
+            <a:prstGeom prst="rect">
+              <a:avLst/>
+            </a:prstGeom>
+          </p:spPr>
+        </p:pic>
+        <p:sp>
+          <p:nvSpPr>
+            <p:cNvPr id="9" name="Rectangle 8">
+              <a:extLst>
+                <a:ext uri="{FF2B5EF4-FFF2-40B4-BE49-F238E27FC236}">
+                  <a16:creationId xmlns:a16="http://schemas.microsoft.com/office/drawing/2014/main" id="{F125AA4E-90F5-C0C7-7F65-2E50DFE1806F}"/>
+                </a:ext>
+              </a:extLst>
+            </p:cNvPr>
+            <p:cNvSpPr/>
+            <p:nvPr/>
+          </p:nvSpPr>
+          <p:spPr>
+            <a:xfrm>
+              <a:off x="7305152" y="0"/>
+              <a:ext cx="3622998" cy="964641"/>
+            </a:xfrm>
+            <a:prstGeom prst="rect">
+              <a:avLst/>
+            </a:prstGeom>
+            <a:solidFill>
+              <a:schemeClr val="bg1"/>
+            </a:solidFill>
+            <a:ln>
+              <a:noFill/>
+            </a:ln>
+          </p:spPr>
+          <p:style>
+            <a:lnRef idx="2">
+              <a:schemeClr val="accent1">
+                <a:shade val="15000"/>
+              </a:schemeClr>
+            </a:lnRef>
+            <a:fillRef idx="1">
+              <a:schemeClr val="accent1"/>
+            </a:fillRef>
+            <a:effectRef idx="0">
+              <a:schemeClr val="accent1"/>
+            </a:effectRef>
+            <a:fontRef idx="minor">
+              <a:schemeClr val="lt1"/>
+            </a:fontRef>
+          </p:style>
+          <p:txBody>
+            <a:bodyPr rtlCol="0" anchor="ctr"/>
+            <a:lstStyle/>
+            <a:p>
+              <a:pPr algn="ctr"/>
+              <a:endParaRPr lang="en-US"/>
+            </a:p>
+          </p:txBody>
+        </p:sp>
+        <p:pic>
+          <p:nvPicPr>
+            <p:cNvPr id="10" name="Picture 9">
+              <a:extLst>
+                <a:ext uri="{FF2B5EF4-FFF2-40B4-BE49-F238E27FC236}">
+                  <a16:creationId xmlns:a16="http://schemas.microsoft.com/office/drawing/2014/main" id="{FE0708AF-1A97-BD52-2D9E-F2FD760D2D1C}"/>
+                </a:ext>
+              </a:extLst>
+            </p:cNvPr>
+            <p:cNvPicPr>
+              <a:picLocks noChangeAspect="1"/>
+            </p:cNvPicPr>
+            <p:nvPr/>
+          </p:nvPicPr>
+          <p:blipFill>
+            <a:blip r:embed="rId3"/>
+            <a:stretch>
+              <a:fillRect/>
+            </a:stretch>
+          </p:blipFill>
+          <p:spPr>
+            <a:xfrm>
+              <a:off x="9533657" y="192626"/>
+              <a:ext cx="1212785" cy="515782"/>
+            </a:xfrm>
+            <a:prstGeom prst="rect">
+              <a:avLst/>
+            </a:prstGeom>
+          </p:spPr>
+        </p:pic>
+        <p:pic>
+          <p:nvPicPr>
+            <p:cNvPr id="12" name="Picture 11" descr="A red and black logo&#10;&#10;Description automatically generated">
+              <a:extLst>
+                <a:ext uri="{FF2B5EF4-FFF2-40B4-BE49-F238E27FC236}">
+                  <a16:creationId xmlns:a16="http://schemas.microsoft.com/office/drawing/2014/main" id="{2EEE5F38-72EB-263C-020C-3C0DF30FD65A}"/>
+                </a:ext>
+              </a:extLst>
+            </p:cNvPr>
+            <p:cNvPicPr>
+              <a:picLocks noChangeAspect="1"/>
+            </p:cNvPicPr>
+            <p:nvPr/>
+          </p:nvPicPr>
+          <p:blipFill>
+            <a:blip r:embed="rId4">
+              <a:extLst>
+                <a:ext uri="{28A0092B-C50C-407E-A947-70E740481C1C}">
+                  <a14:useLocalDpi xmlns:a14="http://schemas.microsoft.com/office/drawing/2010/main" val="0"/>
+                </a:ext>
+              </a:extLst>
+            </a:blip>
+            <a:stretch>
+              <a:fillRect/>
+            </a:stretch>
+          </p:blipFill>
+          <p:spPr>
+            <a:xfrm>
+              <a:off x="7575285" y="192626"/>
+              <a:ext cx="1772353" cy="515782"/>
+            </a:xfrm>
+            <a:prstGeom prst="rect">
+              <a:avLst/>
+            </a:prstGeom>
+          </p:spPr>
+        </p:pic>
+      </p:grpSp>
+    </p:spTree>
+    <p:extLst>
+      <p:ext uri="{BB962C8B-B14F-4D97-AF65-F5344CB8AC3E}">
+        <p14:creationId xmlns:p14="http://schemas.microsoft.com/office/powerpoint/2010/main" val="4101402843"/>
+      </p:ext>
+    </p:extLst>
+  </p:cSld>
+  <p:clrMapOvr>
+    <a:masterClrMapping/>
+  </p:clrMapOvr>
+</p:sld>
+</file>
+
+<file path=ppt/slides/slide3.xml><?xml version="1.0" encoding="utf-8"?>
+<p:sld xmlns:a="http://schemas.openxmlformats.org/drawingml/2006/main" xmlns:r="http://schemas.openxmlformats.org/officeDocument/2006/relationships" xmlns:p="http://schemas.openxmlformats.org/presentationml/2006/main">
+  <p:cSld>
+    <p:spTree>
+      <p:nvGrpSpPr>
+        <p:cNvPr id="1" name="">
+          <a:extLst>
+            <a:ext uri="{FF2B5EF4-FFF2-40B4-BE49-F238E27FC236}">
+              <a16:creationId xmlns:a16="http://schemas.microsoft.com/office/drawing/2014/main" id="{FCBDD4E9-9203-DA68-E35D-5BA70E9E114F}"/>
+            </a:ext>
+          </a:extLst>
+        </p:cNvPr>
+        <p:cNvGrpSpPr/>
+        <p:nvPr/>
+      </p:nvGrpSpPr>
+      <p:grpSpPr>
+        <a:xfrm>
+          <a:off x="0" y="0"/>
+          <a:ext cx="0" cy="0"/>
+          <a:chOff x="0" y="0"/>
+          <a:chExt cx="0" cy="0"/>
+        </a:xfrm>
+      </p:grpSpPr>
+      <p:grpSp>
+        <p:nvGrpSpPr>
+          <p:cNvPr id="16" name="Group 15">
+            <a:extLst>
+              <a:ext uri="{FF2B5EF4-FFF2-40B4-BE49-F238E27FC236}">
+                <a16:creationId xmlns:a16="http://schemas.microsoft.com/office/drawing/2014/main" id="{6AD0FBDF-AB03-3A37-9AF9-5E5E2ABFB302}"/>
+              </a:ext>
+            </a:extLst>
+          </p:cNvPr>
+          <p:cNvGrpSpPr/>
+          <p:nvPr/>
+        </p:nvGrpSpPr>
+        <p:grpSpPr>
+          <a:xfrm>
+            <a:off x="1524000" y="0"/>
             <a:ext cx="9144000" cy="6858000"/>
             <a:chOff x="1784150" y="0"/>
             <a:chExt cx="9144000" cy="6858000"/>
@@ -3680,7 +3893,1083 @@
     </p:spTree>
     <p:extLst>
       <p:ext uri="{BB962C8B-B14F-4D97-AF65-F5344CB8AC3E}">
-        <p14:creationId xmlns:p14="http://schemas.microsoft.com/office/powerpoint/2010/main" val="4101402843"/>
+        <p14:creationId xmlns:p14="http://schemas.microsoft.com/office/powerpoint/2010/main" val="4056493330"/>
+      </p:ext>
+    </p:extLst>
+  </p:cSld>
+  <p:clrMapOvr>
+    <a:masterClrMapping/>
+  </p:clrMapOvr>
+</p:sld>
+</file>
+
+<file path=ppt/slides/slide4.xml><?xml version="1.0" encoding="utf-8"?>
+<p:sld xmlns:a="http://schemas.openxmlformats.org/drawingml/2006/main" xmlns:r="http://schemas.openxmlformats.org/officeDocument/2006/relationships" xmlns:p="http://schemas.openxmlformats.org/presentationml/2006/main">
+  <p:cSld>
+    <p:spTree>
+      <p:nvGrpSpPr>
+        <p:cNvPr id="1" name="">
+          <a:extLst>
+            <a:ext uri="{FF2B5EF4-FFF2-40B4-BE49-F238E27FC236}">
+              <a16:creationId xmlns:a16="http://schemas.microsoft.com/office/drawing/2014/main" id="{70645FF3-5118-1435-338C-FCD40FBD3C05}"/>
+            </a:ext>
+          </a:extLst>
+        </p:cNvPr>
+        <p:cNvGrpSpPr/>
+        <p:nvPr/>
+      </p:nvGrpSpPr>
+      <p:grpSpPr>
+        <a:xfrm>
+          <a:off x="0" y="0"/>
+          <a:ext cx="0" cy="0"/>
+          <a:chOff x="0" y="0"/>
+          <a:chExt cx="0" cy="0"/>
+        </a:xfrm>
+      </p:grpSpPr>
+      <p:grpSp>
+        <p:nvGrpSpPr>
+          <p:cNvPr id="10" name="Group 9">
+            <a:extLst>
+              <a:ext uri="{FF2B5EF4-FFF2-40B4-BE49-F238E27FC236}">
+                <a16:creationId xmlns:a16="http://schemas.microsoft.com/office/drawing/2014/main" id="{683B525F-5808-7F6F-A5C8-5038804DEED6}"/>
+              </a:ext>
+            </a:extLst>
+          </p:cNvPr>
+          <p:cNvGrpSpPr/>
+          <p:nvPr/>
+        </p:nvGrpSpPr>
+        <p:grpSpPr>
+          <a:xfrm>
+            <a:off x="1263850" y="0"/>
+            <a:ext cx="9664301" cy="6857998"/>
+            <a:chOff x="1263850" y="0"/>
+            <a:chExt cx="9664301" cy="6857998"/>
+          </a:xfrm>
+        </p:grpSpPr>
+        <p:pic>
+          <p:nvPicPr>
+            <p:cNvPr id="3" name="Picture 2" descr="A race car on the road&#10;&#10;Description automatically generated">
+              <a:extLst>
+                <a:ext uri="{FF2B5EF4-FFF2-40B4-BE49-F238E27FC236}">
+                  <a16:creationId xmlns:a16="http://schemas.microsoft.com/office/drawing/2014/main" id="{19BBA8DE-CA52-5757-B4D2-86EB68B2A351}"/>
+                </a:ext>
+              </a:extLst>
+            </p:cNvPr>
+            <p:cNvPicPr>
+              <a:picLocks noChangeAspect="1"/>
+            </p:cNvPicPr>
+            <p:nvPr/>
+          </p:nvPicPr>
+          <p:blipFill>
+            <a:blip r:embed="rId2">
+              <a:extLst>
+                <a:ext uri="{28A0092B-C50C-407E-A947-70E740481C1C}">
+                  <a14:useLocalDpi xmlns:a14="http://schemas.microsoft.com/office/drawing/2010/main" val="0"/>
+                </a:ext>
+              </a:extLst>
+            </a:blip>
+            <a:srcRect l="7666" t="6730" r="20608" b="16925"/>
+            <a:stretch/>
+          </p:blipFill>
+          <p:spPr>
+            <a:xfrm>
+              <a:off x="1263850" y="0"/>
+              <a:ext cx="9664300" cy="6857998"/>
+            </a:xfrm>
+            <a:prstGeom prst="rect">
+              <a:avLst/>
+            </a:prstGeom>
+          </p:spPr>
+        </p:pic>
+        <p:sp>
+          <p:nvSpPr>
+            <p:cNvPr id="4" name="Rectangle 3">
+              <a:extLst>
+                <a:ext uri="{FF2B5EF4-FFF2-40B4-BE49-F238E27FC236}">
+                  <a16:creationId xmlns:a16="http://schemas.microsoft.com/office/drawing/2014/main" id="{5B4CE5B9-BB5D-FA8B-0A85-03443A538D58}"/>
+                </a:ext>
+              </a:extLst>
+            </p:cNvPr>
+            <p:cNvSpPr/>
+            <p:nvPr/>
+          </p:nvSpPr>
+          <p:spPr>
+            <a:xfrm>
+              <a:off x="5747004" y="1"/>
+              <a:ext cx="5181147" cy="1133060"/>
+            </a:xfrm>
+            <a:prstGeom prst="rect">
+              <a:avLst/>
+            </a:prstGeom>
+            <a:solidFill>
+              <a:schemeClr val="bg1"/>
+            </a:solidFill>
+            <a:ln>
+              <a:noFill/>
+            </a:ln>
+          </p:spPr>
+          <p:style>
+            <a:lnRef idx="2">
+              <a:schemeClr val="accent1">
+                <a:shade val="15000"/>
+              </a:schemeClr>
+            </a:lnRef>
+            <a:fillRef idx="1">
+              <a:schemeClr val="accent1"/>
+            </a:fillRef>
+            <a:effectRef idx="0">
+              <a:schemeClr val="accent1"/>
+            </a:effectRef>
+            <a:fontRef idx="minor">
+              <a:schemeClr val="lt1"/>
+            </a:fontRef>
+          </p:style>
+          <p:txBody>
+            <a:bodyPr rtlCol="0" anchor="ctr"/>
+            <a:lstStyle/>
+            <a:p>
+              <a:pPr algn="ctr"/>
+              <a:endParaRPr lang="en-US"/>
+            </a:p>
+          </p:txBody>
+        </p:sp>
+        <p:pic>
+          <p:nvPicPr>
+            <p:cNvPr id="6" name="Picture 5" descr="A red and black logo&#10;&#10;Description automatically generated">
+              <a:extLst>
+                <a:ext uri="{FF2B5EF4-FFF2-40B4-BE49-F238E27FC236}">
+                  <a16:creationId xmlns:a16="http://schemas.microsoft.com/office/drawing/2014/main" id="{87E2CABB-6955-8E93-7D43-2E5C455CCDFA}"/>
+                </a:ext>
+              </a:extLst>
+            </p:cNvPr>
+            <p:cNvPicPr>
+              <a:picLocks noChangeAspect="1"/>
+            </p:cNvPicPr>
+            <p:nvPr/>
+          </p:nvPicPr>
+          <p:blipFill>
+            <a:blip r:embed="rId3">
+              <a:extLst>
+                <a:ext uri="{28A0092B-C50C-407E-A947-70E740481C1C}">
+                  <a14:useLocalDpi xmlns:a14="http://schemas.microsoft.com/office/drawing/2010/main" val="0"/>
+                </a:ext>
+              </a:extLst>
+            </a:blip>
+            <a:stretch>
+              <a:fillRect/>
+            </a:stretch>
+          </p:blipFill>
+          <p:spPr>
+            <a:xfrm>
+              <a:off x="6096000" y="243300"/>
+              <a:ext cx="2107686" cy="613369"/>
+            </a:xfrm>
+            <a:prstGeom prst="rect">
+              <a:avLst/>
+            </a:prstGeom>
+          </p:spPr>
+        </p:pic>
+        <p:pic>
+          <p:nvPicPr>
+            <p:cNvPr id="1026" name="Picture 2">
+              <a:extLst>
+                <a:ext uri="{FF2B5EF4-FFF2-40B4-BE49-F238E27FC236}">
+                  <a16:creationId xmlns:a16="http://schemas.microsoft.com/office/drawing/2014/main" id="{272DE445-D707-FB8C-201D-4A798D234E84}"/>
+                </a:ext>
+              </a:extLst>
+            </p:cNvPr>
+            <p:cNvPicPr>
+              <a:picLocks noChangeAspect="1" noChangeArrowheads="1"/>
+            </p:cNvPicPr>
+            <p:nvPr/>
+          </p:nvPicPr>
+          <p:blipFill>
+            <a:blip r:embed="rId4">
+              <a:extLst>
+                <a:ext uri="{28A0092B-C50C-407E-A947-70E740481C1C}">
+                  <a14:useLocalDpi xmlns:a14="http://schemas.microsoft.com/office/drawing/2010/main" val="0"/>
+                </a:ext>
+              </a:extLst>
+            </a:blip>
+            <a:srcRect/>
+            <a:stretch>
+              <a:fillRect/>
+            </a:stretch>
+          </p:blipFill>
+          <p:spPr bwMode="auto">
+            <a:xfrm>
+              <a:off x="8608401" y="184777"/>
+              <a:ext cx="2121486" cy="734196"/>
+            </a:xfrm>
+            <a:prstGeom prst="rect">
+              <a:avLst/>
+            </a:prstGeom>
+            <a:noFill/>
+            <a:extLst>
+              <a:ext uri="{909E8E84-426E-40DD-AFC4-6F175D3DCCD1}">
+                <a14:hiddenFill xmlns:a14="http://schemas.microsoft.com/office/drawing/2010/main">
+                  <a:solidFill>
+                    <a:srgbClr val="FFFFFF"/>
+                  </a:solidFill>
+                </a14:hiddenFill>
+              </a:ext>
+            </a:extLst>
+          </p:spPr>
+        </p:pic>
+      </p:grpSp>
+    </p:spTree>
+    <p:extLst>
+      <p:ext uri="{BB962C8B-B14F-4D97-AF65-F5344CB8AC3E}">
+        <p14:creationId xmlns:p14="http://schemas.microsoft.com/office/powerpoint/2010/main" val="4050587544"/>
+      </p:ext>
+    </p:extLst>
+  </p:cSld>
+  <p:clrMapOvr>
+    <a:masterClrMapping/>
+  </p:clrMapOvr>
+</p:sld>
+</file>
+
+<file path=ppt/slides/slide5.xml><?xml version="1.0" encoding="utf-8"?>
+<p:sld xmlns:a="http://schemas.openxmlformats.org/drawingml/2006/main" xmlns:r="http://schemas.openxmlformats.org/officeDocument/2006/relationships" xmlns:p="http://schemas.openxmlformats.org/presentationml/2006/main">
+  <p:cSld>
+    <p:spTree>
+      <p:nvGrpSpPr>
+        <p:cNvPr id="1" name="">
+          <a:extLst>
+            <a:ext uri="{FF2B5EF4-FFF2-40B4-BE49-F238E27FC236}">
+              <a16:creationId xmlns:a16="http://schemas.microsoft.com/office/drawing/2014/main" id="{F1985EF0-7BB4-0223-559D-B168C538D8EF}"/>
+            </a:ext>
+          </a:extLst>
+        </p:cNvPr>
+        <p:cNvGrpSpPr/>
+        <p:nvPr/>
+      </p:nvGrpSpPr>
+      <p:grpSpPr>
+        <a:xfrm>
+          <a:off x="0" y="0"/>
+          <a:ext cx="0" cy="0"/>
+          <a:chOff x="0" y="0"/>
+          <a:chExt cx="0" cy="0"/>
+        </a:xfrm>
+      </p:grpSpPr>
+      <p:pic>
+        <p:nvPicPr>
+          <p:cNvPr id="8" name="Picture 7" descr="A robot on a wood floor&#10;&#10;Description automatically generated">
+            <a:extLst>
+              <a:ext uri="{FF2B5EF4-FFF2-40B4-BE49-F238E27FC236}">
+                <a16:creationId xmlns:a16="http://schemas.microsoft.com/office/drawing/2014/main" id="{A4346428-767B-C000-7D67-C08DE252623C}"/>
+              </a:ext>
+            </a:extLst>
+          </p:cNvPr>
+          <p:cNvPicPr>
+            <a:picLocks noChangeAspect="1"/>
+          </p:cNvPicPr>
+          <p:nvPr/>
+        </p:nvPicPr>
+        <p:blipFill>
+          <a:blip r:embed="rId2">
+            <a:extLst>
+              <a:ext uri="{28A0092B-C50C-407E-A947-70E740481C1C}">
+                <a14:useLocalDpi xmlns:a14="http://schemas.microsoft.com/office/drawing/2010/main" val="0"/>
+              </a:ext>
+            </a:extLst>
+          </a:blip>
+          <a:srcRect t="27433" b="11111"/>
+          <a:stretch/>
+        </p:blipFill>
+        <p:spPr>
+          <a:xfrm>
+            <a:off x="1694011" y="-1"/>
+            <a:ext cx="6284297" cy="6858000"/>
+          </a:xfrm>
+          <a:prstGeom prst="rect">
+            <a:avLst/>
+          </a:prstGeom>
+        </p:spPr>
+      </p:pic>
+      <p:cxnSp>
+        <p:nvCxnSpPr>
+          <p:cNvPr id="16" name="Straight Connector 15">
+            <a:extLst>
+              <a:ext uri="{FF2B5EF4-FFF2-40B4-BE49-F238E27FC236}">
+                <a16:creationId xmlns:a16="http://schemas.microsoft.com/office/drawing/2014/main" id="{AF8BB6A2-5299-16E4-153C-C5C23DBAE33E}"/>
+              </a:ext>
+            </a:extLst>
+          </p:cNvPr>
+          <p:cNvCxnSpPr>
+            <a:cxnSpLocks/>
+          </p:cNvCxnSpPr>
+          <p:nvPr/>
+        </p:nvCxnSpPr>
+        <p:spPr>
+          <a:xfrm flipV="1">
+            <a:off x="9664300" y="0"/>
+            <a:ext cx="0" cy="3428999"/>
+          </a:xfrm>
+          <a:prstGeom prst="line">
+            <a:avLst/>
+          </a:prstGeom>
+        </p:spPr>
+        <p:style>
+          <a:lnRef idx="2">
+            <a:schemeClr val="accent1"/>
+          </a:lnRef>
+          <a:fillRef idx="0">
+            <a:schemeClr val="accent1"/>
+          </a:fillRef>
+          <a:effectRef idx="1">
+            <a:schemeClr val="accent1"/>
+          </a:effectRef>
+          <a:fontRef idx="minor">
+            <a:schemeClr val="tx1"/>
+          </a:fontRef>
+        </p:style>
+      </p:cxnSp>
+      <p:sp>
+        <p:nvSpPr>
+          <p:cNvPr id="18" name="TextBox 17">
+            <a:extLst>
+              <a:ext uri="{FF2B5EF4-FFF2-40B4-BE49-F238E27FC236}">
+                <a16:creationId xmlns:a16="http://schemas.microsoft.com/office/drawing/2014/main" id="{DC8E1191-31CA-98C1-FFCF-30D5291030B2}"/>
+              </a:ext>
+            </a:extLst>
+          </p:cNvPr>
+          <p:cNvSpPr txBox="1"/>
+          <p:nvPr/>
+        </p:nvSpPr>
+        <p:spPr>
+          <a:xfrm>
+            <a:off x="7039892" y="2342535"/>
+            <a:ext cx="1893485" cy="461665"/>
+          </a:xfrm>
+          <a:prstGeom prst="rect">
+            <a:avLst/>
+          </a:prstGeom>
+          <a:solidFill>
+            <a:schemeClr val="bg1"/>
+          </a:solidFill>
+          <a:ln>
+            <a:solidFill>
+              <a:schemeClr val="tx1"/>
+            </a:solidFill>
+          </a:ln>
+        </p:spPr>
+        <p:txBody>
+          <a:bodyPr wrap="square" rtlCol="0">
+            <a:spAutoFit/>
+          </a:bodyPr>
+          <a:lstStyle/>
+          <a:p>
+            <a:pPr algn="ctr"/>
+            <a:r>
+              <a:rPr lang="fr-CH" sz="2400" b="1" dirty="0"/>
+              <a:t>Camera</a:t>
+            </a:r>
+            <a:endParaRPr lang="en-US" sz="2400" b="1" dirty="0"/>
+          </a:p>
+        </p:txBody>
+      </p:sp>
+      <p:sp>
+        <p:nvSpPr>
+          <p:cNvPr id="19" name="TextBox 18">
+            <a:extLst>
+              <a:ext uri="{FF2B5EF4-FFF2-40B4-BE49-F238E27FC236}">
+                <a16:creationId xmlns:a16="http://schemas.microsoft.com/office/drawing/2014/main" id="{0B029E06-0B76-ABEE-02E8-BB47BECE4BE5}"/>
+              </a:ext>
+            </a:extLst>
+          </p:cNvPr>
+          <p:cNvSpPr txBox="1"/>
+          <p:nvPr/>
+        </p:nvSpPr>
+        <p:spPr>
+          <a:xfrm>
+            <a:off x="7039892" y="3084102"/>
+            <a:ext cx="1893485" cy="461665"/>
+          </a:xfrm>
+          <a:prstGeom prst="rect">
+            <a:avLst/>
+          </a:prstGeom>
+          <a:solidFill>
+            <a:schemeClr val="bg1"/>
+          </a:solidFill>
+          <a:ln>
+            <a:solidFill>
+              <a:schemeClr val="tx1"/>
+            </a:solidFill>
+          </a:ln>
+        </p:spPr>
+        <p:txBody>
+          <a:bodyPr wrap="square" rtlCol="0">
+            <a:spAutoFit/>
+          </a:bodyPr>
+          <a:lstStyle/>
+          <a:p>
+            <a:pPr algn="ctr"/>
+            <a:r>
+              <a:rPr lang="fr-CH" sz="2400" b="1" dirty="0" err="1"/>
+              <a:t>LiDAR</a:t>
+            </a:r>
+            <a:endParaRPr lang="en-US" sz="2400" b="1" dirty="0"/>
+          </a:p>
+        </p:txBody>
+      </p:sp>
+      <p:sp>
+        <p:nvSpPr>
+          <p:cNvPr id="20" name="TextBox 19">
+            <a:extLst>
+              <a:ext uri="{FF2B5EF4-FFF2-40B4-BE49-F238E27FC236}">
+                <a16:creationId xmlns:a16="http://schemas.microsoft.com/office/drawing/2014/main" id="{CC70A843-EC14-B5BC-F832-F86DA9680C45}"/>
+              </a:ext>
+            </a:extLst>
+          </p:cNvPr>
+          <p:cNvSpPr txBox="1"/>
+          <p:nvPr/>
+        </p:nvSpPr>
+        <p:spPr>
+          <a:xfrm>
+            <a:off x="5022540" y="43725"/>
+            <a:ext cx="2089460" cy="830997"/>
+          </a:xfrm>
+          <a:prstGeom prst="rect">
+            <a:avLst/>
+          </a:prstGeom>
+          <a:solidFill>
+            <a:schemeClr val="bg1"/>
+          </a:solidFill>
+          <a:ln>
+            <a:solidFill>
+              <a:schemeClr val="tx1"/>
+            </a:solidFill>
+          </a:ln>
+        </p:spPr>
+        <p:txBody>
+          <a:bodyPr wrap="square" rtlCol="0">
+            <a:spAutoFit/>
+          </a:bodyPr>
+          <a:lstStyle/>
+          <a:p>
+            <a:pPr algn="ctr"/>
+            <a:r>
+              <a:rPr lang="fr-CH" sz="2400" b="1" dirty="0" err="1"/>
+              <a:t>Nvidia</a:t>
+            </a:r>
+            <a:r>
+              <a:rPr lang="fr-CH" sz="2400" b="1" dirty="0"/>
+              <a:t> </a:t>
+            </a:r>
+            <a:r>
+              <a:rPr lang="fr-CH" sz="2400" b="1" dirty="0" err="1"/>
+              <a:t>Jetson</a:t>
+            </a:r>
+            <a:r>
+              <a:rPr lang="fr-CH" sz="2400" b="1" dirty="0"/>
+              <a:t> computer</a:t>
+            </a:r>
+            <a:endParaRPr lang="en-US" sz="2400" b="1" dirty="0"/>
+          </a:p>
+        </p:txBody>
+      </p:sp>
+      <p:sp>
+        <p:nvSpPr>
+          <p:cNvPr id="21" name="TextBox 20">
+            <a:extLst>
+              <a:ext uri="{FF2B5EF4-FFF2-40B4-BE49-F238E27FC236}">
+                <a16:creationId xmlns:a16="http://schemas.microsoft.com/office/drawing/2014/main" id="{45A40913-29CB-D8D3-8AD3-0FCE4DD3B751}"/>
+              </a:ext>
+            </a:extLst>
+          </p:cNvPr>
+          <p:cNvSpPr txBox="1"/>
+          <p:nvPr/>
+        </p:nvSpPr>
+        <p:spPr>
+          <a:xfrm>
+            <a:off x="375921" y="228390"/>
+            <a:ext cx="1893485" cy="461665"/>
+          </a:xfrm>
+          <a:prstGeom prst="rect">
+            <a:avLst/>
+          </a:prstGeom>
+          <a:solidFill>
+            <a:schemeClr val="bg1"/>
+          </a:solidFill>
+          <a:ln>
+            <a:solidFill>
+              <a:schemeClr val="tx1"/>
+            </a:solidFill>
+          </a:ln>
+        </p:spPr>
+        <p:txBody>
+          <a:bodyPr wrap="square" rtlCol="0">
+            <a:spAutoFit/>
+          </a:bodyPr>
+          <a:lstStyle/>
+          <a:p>
+            <a:pPr algn="ctr"/>
+            <a:r>
+              <a:rPr lang="fr-CH" sz="2400" b="1" dirty="0"/>
+              <a:t>Power </a:t>
+            </a:r>
+            <a:r>
+              <a:rPr lang="fr-CH" sz="2400" b="1" dirty="0" err="1"/>
+              <a:t>bank</a:t>
+            </a:r>
+            <a:endParaRPr lang="en-US" sz="2400" b="1" dirty="0"/>
+          </a:p>
+        </p:txBody>
+      </p:sp>
+      <p:sp>
+        <p:nvSpPr>
+          <p:cNvPr id="22" name="TextBox 21">
+            <a:extLst>
+              <a:ext uri="{FF2B5EF4-FFF2-40B4-BE49-F238E27FC236}">
+                <a16:creationId xmlns:a16="http://schemas.microsoft.com/office/drawing/2014/main" id="{1435779C-A68F-7DEB-AEEF-47F436E3438F}"/>
+              </a:ext>
+            </a:extLst>
+          </p:cNvPr>
+          <p:cNvSpPr txBox="1"/>
+          <p:nvPr/>
+        </p:nvSpPr>
+        <p:spPr>
+          <a:xfrm>
+            <a:off x="73546" y="1076742"/>
+            <a:ext cx="2195860" cy="830997"/>
+          </a:xfrm>
+          <a:prstGeom prst="rect">
+            <a:avLst/>
+          </a:prstGeom>
+          <a:solidFill>
+            <a:schemeClr val="bg1"/>
+          </a:solidFill>
+          <a:ln>
+            <a:solidFill>
+              <a:schemeClr val="tx1"/>
+            </a:solidFill>
+          </a:ln>
+        </p:spPr>
+        <p:txBody>
+          <a:bodyPr wrap="square" rtlCol="0">
+            <a:spAutoFit/>
+          </a:bodyPr>
+          <a:lstStyle/>
+          <a:p>
+            <a:pPr algn="ctr"/>
+            <a:r>
+              <a:rPr lang="fr-CH" sz="2400" b="1" dirty="0"/>
+              <a:t>CAN </a:t>
+            </a:r>
+            <a:r>
+              <a:rPr lang="fr-CH" sz="2400" b="1" dirty="0" err="1"/>
+              <a:t>converter</a:t>
+            </a:r>
+            <a:r>
+              <a:rPr lang="fr-CH" sz="2400" b="1" dirty="0"/>
+              <a:t> PCB</a:t>
+            </a:r>
+            <a:endParaRPr lang="en-US" sz="2400" b="1" dirty="0"/>
+          </a:p>
+        </p:txBody>
+      </p:sp>
+      <p:sp>
+        <p:nvSpPr>
+          <p:cNvPr id="23" name="TextBox 22">
+            <a:extLst>
+              <a:ext uri="{FF2B5EF4-FFF2-40B4-BE49-F238E27FC236}">
+                <a16:creationId xmlns:a16="http://schemas.microsoft.com/office/drawing/2014/main" id="{DEEB2390-4230-6DA7-048A-252A80016CF2}"/>
+              </a:ext>
+            </a:extLst>
+          </p:cNvPr>
+          <p:cNvSpPr txBox="1"/>
+          <p:nvPr/>
+        </p:nvSpPr>
+        <p:spPr>
+          <a:xfrm>
+            <a:off x="7112000" y="1318651"/>
+            <a:ext cx="1725900" cy="461665"/>
+          </a:xfrm>
+          <a:prstGeom prst="rect">
+            <a:avLst/>
+          </a:prstGeom>
+          <a:solidFill>
+            <a:schemeClr val="bg1"/>
+          </a:solidFill>
+          <a:ln>
+            <a:solidFill>
+              <a:schemeClr val="tx1"/>
+            </a:solidFill>
+          </a:ln>
+        </p:spPr>
+        <p:txBody>
+          <a:bodyPr wrap="square" rtlCol="0">
+            <a:spAutoFit/>
+          </a:bodyPr>
+          <a:lstStyle/>
+          <a:p>
+            <a:pPr algn="ctr"/>
+            <a:r>
+              <a:rPr lang="fr-CH" sz="2400" b="1" dirty="0"/>
+              <a:t>INS + RTK</a:t>
+            </a:r>
+            <a:endParaRPr lang="en-US" sz="2400" b="1" dirty="0"/>
+          </a:p>
+        </p:txBody>
+      </p:sp>
+      <p:sp>
+        <p:nvSpPr>
+          <p:cNvPr id="24" name="TextBox 23">
+            <a:extLst>
+              <a:ext uri="{FF2B5EF4-FFF2-40B4-BE49-F238E27FC236}">
+                <a16:creationId xmlns:a16="http://schemas.microsoft.com/office/drawing/2014/main" id="{501D862D-9F26-82E4-BACF-7138FB2EC12F}"/>
+              </a:ext>
+            </a:extLst>
+          </p:cNvPr>
+          <p:cNvSpPr txBox="1"/>
+          <p:nvPr/>
+        </p:nvSpPr>
+        <p:spPr>
+          <a:xfrm>
+            <a:off x="713626" y="2323238"/>
+            <a:ext cx="1555780" cy="830997"/>
+          </a:xfrm>
+          <a:prstGeom prst="rect">
+            <a:avLst/>
+          </a:prstGeom>
+          <a:solidFill>
+            <a:schemeClr val="bg1"/>
+          </a:solidFill>
+          <a:ln>
+            <a:solidFill>
+              <a:schemeClr val="tx1"/>
+            </a:solidFill>
+          </a:ln>
+        </p:spPr>
+        <p:txBody>
+          <a:bodyPr wrap="square" rtlCol="0">
+            <a:spAutoFit/>
+          </a:bodyPr>
+          <a:lstStyle/>
+          <a:p>
+            <a:pPr algn="ctr"/>
+            <a:r>
+              <a:rPr lang="fr-CH" sz="2400" b="1" dirty="0"/>
+              <a:t>Arduino </a:t>
+            </a:r>
+            <a:r>
+              <a:rPr lang="fr-CH" sz="2400" b="1" dirty="0" err="1"/>
+              <a:t>Mega</a:t>
+            </a:r>
+            <a:endParaRPr lang="en-US" sz="2400" b="1" dirty="0"/>
+          </a:p>
+        </p:txBody>
+      </p:sp>
+      <p:cxnSp>
+        <p:nvCxnSpPr>
+          <p:cNvPr id="26" name="Straight Arrow Connector 25">
+            <a:extLst>
+              <a:ext uri="{FF2B5EF4-FFF2-40B4-BE49-F238E27FC236}">
+                <a16:creationId xmlns:a16="http://schemas.microsoft.com/office/drawing/2014/main" id="{E7CCA9ED-1074-0EBC-2ED7-AED8FE39743E}"/>
+              </a:ext>
+            </a:extLst>
+          </p:cNvPr>
+          <p:cNvCxnSpPr>
+            <a:cxnSpLocks/>
+            <a:stCxn id="21" idx="3"/>
+          </p:cNvCxnSpPr>
+          <p:nvPr/>
+        </p:nvCxnSpPr>
+        <p:spPr>
+          <a:xfrm>
+            <a:off x="2269406" y="459223"/>
+            <a:ext cx="755453" cy="75429"/>
+          </a:xfrm>
+          <a:prstGeom prst="straightConnector1">
+            <a:avLst/>
+          </a:prstGeom>
+          <a:ln w="28575">
+            <a:solidFill>
+              <a:srgbClr val="66FFFF"/>
+            </a:solidFill>
+            <a:tailEnd type="triangle"/>
+          </a:ln>
+        </p:spPr>
+        <p:style>
+          <a:lnRef idx="2">
+            <a:schemeClr val="accent1"/>
+          </a:lnRef>
+          <a:fillRef idx="0">
+            <a:schemeClr val="accent1"/>
+          </a:fillRef>
+          <a:effectRef idx="1">
+            <a:schemeClr val="accent1"/>
+          </a:effectRef>
+          <a:fontRef idx="minor">
+            <a:schemeClr val="tx1"/>
+          </a:fontRef>
+        </p:style>
+      </p:cxnSp>
+      <p:cxnSp>
+        <p:nvCxnSpPr>
+          <p:cNvPr id="28" name="Straight Arrow Connector 27">
+            <a:extLst>
+              <a:ext uri="{FF2B5EF4-FFF2-40B4-BE49-F238E27FC236}">
+                <a16:creationId xmlns:a16="http://schemas.microsoft.com/office/drawing/2014/main" id="{E4C2585A-AB47-D252-0A63-098E77153CCB}"/>
+              </a:ext>
+            </a:extLst>
+          </p:cNvPr>
+          <p:cNvCxnSpPr>
+            <a:cxnSpLocks/>
+            <a:stCxn id="22" idx="3"/>
+          </p:cNvCxnSpPr>
+          <p:nvPr/>
+        </p:nvCxnSpPr>
+        <p:spPr>
+          <a:xfrm>
+            <a:off x="2269406" y="1492241"/>
+            <a:ext cx="911691" cy="275374"/>
+          </a:xfrm>
+          <a:prstGeom prst="straightConnector1">
+            <a:avLst/>
+          </a:prstGeom>
+          <a:ln w="28575">
+            <a:solidFill>
+              <a:srgbClr val="66FFFF"/>
+            </a:solidFill>
+            <a:tailEnd type="triangle"/>
+          </a:ln>
+        </p:spPr>
+        <p:style>
+          <a:lnRef idx="2">
+            <a:schemeClr val="accent1"/>
+          </a:lnRef>
+          <a:fillRef idx="0">
+            <a:schemeClr val="accent1"/>
+          </a:fillRef>
+          <a:effectRef idx="1">
+            <a:schemeClr val="accent1"/>
+          </a:effectRef>
+          <a:fontRef idx="minor">
+            <a:schemeClr val="tx1"/>
+          </a:fontRef>
+        </p:style>
+      </p:cxnSp>
+      <p:cxnSp>
+        <p:nvCxnSpPr>
+          <p:cNvPr id="31" name="Straight Arrow Connector 30">
+            <a:extLst>
+              <a:ext uri="{FF2B5EF4-FFF2-40B4-BE49-F238E27FC236}">
+                <a16:creationId xmlns:a16="http://schemas.microsoft.com/office/drawing/2014/main" id="{CA0BDBE7-DC0B-393D-57DE-579EECF695ED}"/>
+              </a:ext>
+            </a:extLst>
+          </p:cNvPr>
+          <p:cNvCxnSpPr>
+            <a:cxnSpLocks/>
+            <a:stCxn id="23" idx="1"/>
+          </p:cNvCxnSpPr>
+          <p:nvPr/>
+        </p:nvCxnSpPr>
+        <p:spPr>
+          <a:xfrm flipH="1">
+            <a:off x="4531360" y="1549484"/>
+            <a:ext cx="2580640" cy="8143"/>
+          </a:xfrm>
+          <a:prstGeom prst="straightConnector1">
+            <a:avLst/>
+          </a:prstGeom>
+          <a:ln w="28575">
+            <a:solidFill>
+              <a:srgbClr val="66FFFF"/>
+            </a:solidFill>
+            <a:tailEnd type="triangle"/>
+          </a:ln>
+        </p:spPr>
+        <p:style>
+          <a:lnRef idx="2">
+            <a:schemeClr val="accent1"/>
+          </a:lnRef>
+          <a:fillRef idx="0">
+            <a:schemeClr val="accent1"/>
+          </a:fillRef>
+          <a:effectRef idx="1">
+            <a:schemeClr val="accent1"/>
+          </a:effectRef>
+          <a:fontRef idx="minor">
+            <a:schemeClr val="tx1"/>
+          </a:fontRef>
+        </p:style>
+      </p:cxnSp>
+      <p:cxnSp>
+        <p:nvCxnSpPr>
+          <p:cNvPr id="34" name="Straight Arrow Connector 33">
+            <a:extLst>
+              <a:ext uri="{FF2B5EF4-FFF2-40B4-BE49-F238E27FC236}">
+                <a16:creationId xmlns:a16="http://schemas.microsoft.com/office/drawing/2014/main" id="{2B24DF45-D5C3-8D84-C0A8-2B90418BE301}"/>
+              </a:ext>
+            </a:extLst>
+          </p:cNvPr>
+          <p:cNvCxnSpPr>
+            <a:cxnSpLocks/>
+            <a:stCxn id="24" idx="3"/>
+          </p:cNvCxnSpPr>
+          <p:nvPr/>
+        </p:nvCxnSpPr>
+        <p:spPr>
+          <a:xfrm flipV="1">
+            <a:off x="2269406" y="2294426"/>
+            <a:ext cx="980385" cy="444311"/>
+          </a:xfrm>
+          <a:prstGeom prst="straightConnector1">
+            <a:avLst/>
+          </a:prstGeom>
+          <a:ln w="28575">
+            <a:solidFill>
+              <a:srgbClr val="66FFFF"/>
+            </a:solidFill>
+            <a:tailEnd type="triangle"/>
+          </a:ln>
+        </p:spPr>
+        <p:style>
+          <a:lnRef idx="2">
+            <a:schemeClr val="accent1"/>
+          </a:lnRef>
+          <a:fillRef idx="0">
+            <a:schemeClr val="accent1"/>
+          </a:fillRef>
+          <a:effectRef idx="1">
+            <a:schemeClr val="accent1"/>
+          </a:effectRef>
+          <a:fontRef idx="minor">
+            <a:schemeClr val="tx1"/>
+          </a:fontRef>
+        </p:style>
+      </p:cxnSp>
+      <p:cxnSp>
+        <p:nvCxnSpPr>
+          <p:cNvPr id="37" name="Straight Arrow Connector 36">
+            <a:extLst>
+              <a:ext uri="{FF2B5EF4-FFF2-40B4-BE49-F238E27FC236}">
+                <a16:creationId xmlns:a16="http://schemas.microsoft.com/office/drawing/2014/main" id="{35831419-0606-2971-47FD-71F9D6DA9E57}"/>
+              </a:ext>
+            </a:extLst>
+          </p:cNvPr>
+          <p:cNvCxnSpPr>
+            <a:cxnSpLocks/>
+            <a:stCxn id="20" idx="1"/>
+          </p:cNvCxnSpPr>
+          <p:nvPr/>
+        </p:nvCxnSpPr>
+        <p:spPr>
+          <a:xfrm flipH="1">
+            <a:off x="4262908" y="459224"/>
+            <a:ext cx="759632" cy="523041"/>
+          </a:xfrm>
+          <a:prstGeom prst="straightConnector1">
+            <a:avLst/>
+          </a:prstGeom>
+          <a:ln w="28575">
+            <a:solidFill>
+              <a:srgbClr val="66FFFF"/>
+            </a:solidFill>
+            <a:tailEnd type="triangle"/>
+          </a:ln>
+        </p:spPr>
+        <p:style>
+          <a:lnRef idx="2">
+            <a:schemeClr val="accent1"/>
+          </a:lnRef>
+          <a:fillRef idx="0">
+            <a:schemeClr val="accent1"/>
+          </a:fillRef>
+          <a:effectRef idx="1">
+            <a:schemeClr val="accent1"/>
+          </a:effectRef>
+          <a:fontRef idx="minor">
+            <a:schemeClr val="tx1"/>
+          </a:fontRef>
+        </p:style>
+      </p:cxnSp>
+      <p:cxnSp>
+        <p:nvCxnSpPr>
+          <p:cNvPr id="40" name="Straight Arrow Connector 39">
+            <a:extLst>
+              <a:ext uri="{FF2B5EF4-FFF2-40B4-BE49-F238E27FC236}">
+                <a16:creationId xmlns:a16="http://schemas.microsoft.com/office/drawing/2014/main" id="{2776C27F-31E9-F00F-E49D-34F83F060965}"/>
+              </a:ext>
+            </a:extLst>
+          </p:cNvPr>
+          <p:cNvCxnSpPr>
+            <a:cxnSpLocks/>
+            <a:stCxn id="18" idx="1"/>
+          </p:cNvCxnSpPr>
+          <p:nvPr/>
+        </p:nvCxnSpPr>
+        <p:spPr>
+          <a:xfrm flipH="1" flipV="1">
+            <a:off x="6289040" y="2516481"/>
+            <a:ext cx="750852" cy="56887"/>
+          </a:xfrm>
+          <a:prstGeom prst="straightConnector1">
+            <a:avLst/>
+          </a:prstGeom>
+          <a:ln w="28575">
+            <a:solidFill>
+              <a:srgbClr val="66FFFF"/>
+            </a:solidFill>
+            <a:tailEnd type="triangle"/>
+          </a:ln>
+        </p:spPr>
+        <p:style>
+          <a:lnRef idx="2">
+            <a:schemeClr val="accent1"/>
+          </a:lnRef>
+          <a:fillRef idx="0">
+            <a:schemeClr val="accent1"/>
+          </a:fillRef>
+          <a:effectRef idx="1">
+            <a:schemeClr val="accent1"/>
+          </a:effectRef>
+          <a:fontRef idx="minor">
+            <a:schemeClr val="tx1"/>
+          </a:fontRef>
+        </p:style>
+      </p:cxnSp>
+      <p:cxnSp>
+        <p:nvCxnSpPr>
+          <p:cNvPr id="43" name="Straight Arrow Connector 42">
+            <a:extLst>
+              <a:ext uri="{FF2B5EF4-FFF2-40B4-BE49-F238E27FC236}">
+                <a16:creationId xmlns:a16="http://schemas.microsoft.com/office/drawing/2014/main" id="{B38C4F9C-6DDB-776B-44B3-0C9EC55AB298}"/>
+              </a:ext>
+            </a:extLst>
+          </p:cNvPr>
+          <p:cNvCxnSpPr>
+            <a:cxnSpLocks/>
+            <a:stCxn id="19" idx="1"/>
+          </p:cNvCxnSpPr>
+          <p:nvPr/>
+        </p:nvCxnSpPr>
+        <p:spPr>
+          <a:xfrm flipH="1">
+            <a:off x="5929632" y="3314935"/>
+            <a:ext cx="1110260" cy="92333"/>
+          </a:xfrm>
+          <a:prstGeom prst="straightConnector1">
+            <a:avLst/>
+          </a:prstGeom>
+          <a:ln w="28575">
+            <a:solidFill>
+              <a:srgbClr val="66FFFF"/>
+            </a:solidFill>
+            <a:tailEnd type="triangle"/>
+          </a:ln>
+        </p:spPr>
+        <p:style>
+          <a:lnRef idx="2">
+            <a:schemeClr val="accent1"/>
+          </a:lnRef>
+          <a:fillRef idx="0">
+            <a:schemeClr val="accent1"/>
+          </a:fillRef>
+          <a:effectRef idx="1">
+            <a:schemeClr val="accent1"/>
+          </a:effectRef>
+          <a:fontRef idx="minor">
+            <a:schemeClr val="tx1"/>
+          </a:fontRef>
+        </p:style>
+      </p:cxnSp>
+      <p:sp>
+        <p:nvSpPr>
+          <p:cNvPr id="53" name="TextBox 52">
+            <a:extLst>
+              <a:ext uri="{FF2B5EF4-FFF2-40B4-BE49-F238E27FC236}">
+                <a16:creationId xmlns:a16="http://schemas.microsoft.com/office/drawing/2014/main" id="{DDB1676C-C1AD-AE7C-B5D6-96E86A9CC8B9}"/>
+              </a:ext>
+            </a:extLst>
+          </p:cNvPr>
+          <p:cNvSpPr txBox="1"/>
+          <p:nvPr/>
+        </p:nvSpPr>
+        <p:spPr>
+          <a:xfrm>
+            <a:off x="713626" y="3681103"/>
+            <a:ext cx="1555780" cy="461665"/>
+          </a:xfrm>
+          <a:prstGeom prst="rect">
+            <a:avLst/>
+          </a:prstGeom>
+          <a:solidFill>
+            <a:schemeClr val="bg1"/>
+          </a:solidFill>
+          <a:ln>
+            <a:solidFill>
+              <a:schemeClr val="tx1"/>
+            </a:solidFill>
+          </a:ln>
+        </p:spPr>
+        <p:txBody>
+          <a:bodyPr wrap="square" rtlCol="0">
+            <a:spAutoFit/>
+          </a:bodyPr>
+          <a:lstStyle/>
+          <a:p>
+            <a:pPr algn="ctr"/>
+            <a:r>
+              <a:rPr lang="fr-CH" sz="2400" b="1" dirty="0"/>
+              <a:t>RC car</a:t>
+            </a:r>
+            <a:endParaRPr lang="en-US" sz="2400" b="1" dirty="0"/>
+          </a:p>
+        </p:txBody>
+      </p:sp>
+      <p:cxnSp>
+        <p:nvCxnSpPr>
+          <p:cNvPr id="54" name="Straight Arrow Connector 53">
+            <a:extLst>
+              <a:ext uri="{FF2B5EF4-FFF2-40B4-BE49-F238E27FC236}">
+                <a16:creationId xmlns:a16="http://schemas.microsoft.com/office/drawing/2014/main" id="{6F673E02-5819-900A-E5A1-3C6E37CF05F6}"/>
+              </a:ext>
+            </a:extLst>
+          </p:cNvPr>
+          <p:cNvCxnSpPr>
+            <a:cxnSpLocks/>
+            <a:stCxn id="53" idx="3"/>
+          </p:cNvCxnSpPr>
+          <p:nvPr/>
+        </p:nvCxnSpPr>
+        <p:spPr>
+          <a:xfrm>
+            <a:off x="2269406" y="3911936"/>
+            <a:ext cx="1198783" cy="211712"/>
+          </a:xfrm>
+          <a:prstGeom prst="straightConnector1">
+            <a:avLst/>
+          </a:prstGeom>
+          <a:ln w="28575">
+            <a:solidFill>
+              <a:srgbClr val="66FFFF"/>
+            </a:solidFill>
+            <a:tailEnd type="triangle"/>
+          </a:ln>
+        </p:spPr>
+        <p:style>
+          <a:lnRef idx="2">
+            <a:schemeClr val="accent1"/>
+          </a:lnRef>
+          <a:fillRef idx="0">
+            <a:schemeClr val="accent1"/>
+          </a:fillRef>
+          <a:effectRef idx="1">
+            <a:schemeClr val="accent1"/>
+          </a:effectRef>
+          <a:fontRef idx="minor">
+            <a:schemeClr val="tx1"/>
+          </a:fontRef>
+        </p:style>
+      </p:cxnSp>
+    </p:spTree>
+    <p:extLst>
+      <p:ext uri="{BB962C8B-B14F-4D97-AF65-F5344CB8AC3E}">
+        <p14:creationId xmlns:p14="http://schemas.microsoft.com/office/powerpoint/2010/main" val="2954772425"/>
       </p:ext>
     </p:extLst>
   </p:cSld>

</xml_diff>